<commit_message>
Start working on end-user PPT
+ Little bugfix
</commit_message>
<xml_diff>
--- a/[Developer]/PPT és Dokumentáció/PawnHub end-user presentation.pptx
+++ b/[Developer]/PPT és Dokumentáció/PawnHub end-user presentation.pptx
@@ -7,6 +7,17 @@
   <p:sldIdLst>
     <p:sldId id="256" r:id="rId2"/>
     <p:sldId id="257" r:id="rId3"/>
+    <p:sldId id="259" r:id="rId4"/>
+    <p:sldId id="260" r:id="rId5"/>
+    <p:sldId id="267" r:id="rId6"/>
+    <p:sldId id="261" r:id="rId7"/>
+    <p:sldId id="262" r:id="rId8"/>
+    <p:sldId id="263" r:id="rId9"/>
+    <p:sldId id="268" r:id="rId10"/>
+    <p:sldId id="269" r:id="rId11"/>
+    <p:sldId id="264" r:id="rId12"/>
+    <p:sldId id="265" r:id="rId13"/>
+    <p:sldId id="266" r:id="rId14"/>
   </p:sldIdLst>
   <p:sldSz cx="12192000" cy="6858000"/>
   <p:notesSz cx="6858000" cy="9144000"/>
@@ -8711,6 +8722,180 @@
 </p:sld>
 </file>
 
+<file path=ppt/slides/slide10.xml><?xml version="1.0" encoding="utf-8"?>
+<p:sld xmlns:a="http://schemas.openxmlformats.org/drawingml/2006/main" xmlns:r="http://schemas.openxmlformats.org/officeDocument/2006/relationships" xmlns:p="http://schemas.openxmlformats.org/presentationml/2006/main">
+  <p:cSld>
+    <p:spTree>
+      <p:nvGrpSpPr>
+        <p:cNvPr id="1" name="">
+          <a:extLst>
+            <a:ext uri="{FF2B5EF4-FFF2-40B4-BE49-F238E27FC236}">
+              <a16:creationId xmlns:a16="http://schemas.microsoft.com/office/drawing/2014/main" id="{54256E40-5BC3-420F-5E32-CF5A1873E2A9}"/>
+            </a:ext>
+          </a:extLst>
+        </p:cNvPr>
+        <p:cNvGrpSpPr/>
+        <p:nvPr/>
+      </p:nvGrpSpPr>
+      <p:grpSpPr>
+        <a:xfrm>
+          <a:off x="0" y="0"/>
+          <a:ext cx="0" cy="0"/>
+          <a:chOff x="0" y="0"/>
+          <a:chExt cx="0" cy="0"/>
+        </a:xfrm>
+      </p:grpSpPr>
+      <p:pic>
+        <p:nvPicPr>
+          <p:cNvPr id="3" name="Picture 2">
+            <a:extLst>
+              <a:ext uri="{FF2B5EF4-FFF2-40B4-BE49-F238E27FC236}">
+                <a16:creationId xmlns:a16="http://schemas.microsoft.com/office/drawing/2014/main" id="{2B6E5985-CAB1-5B39-C955-D3F37E2D79F0}"/>
+              </a:ext>
+            </a:extLst>
+          </p:cNvPr>
+          <p:cNvPicPr>
+            <a:picLocks noChangeAspect="1"/>
+          </p:cNvPicPr>
+          <p:nvPr/>
+        </p:nvPicPr>
+        <p:blipFill>
+          <a:blip r:embed="rId2"/>
+          <a:stretch>
+            <a:fillRect/>
+          </a:stretch>
+        </p:blipFill>
+        <p:spPr>
+          <a:xfrm>
+            <a:off x="348342" y="0"/>
+            <a:ext cx="11495315" cy="6858000"/>
+          </a:xfrm>
+          <a:prstGeom prst="rect">
+            <a:avLst/>
+          </a:prstGeom>
+        </p:spPr>
+      </p:pic>
+    </p:spTree>
+    <p:extLst>
+      <p:ext uri="{BB962C8B-B14F-4D97-AF65-F5344CB8AC3E}">
+        <p14:creationId xmlns:p14="http://schemas.microsoft.com/office/powerpoint/2010/main" val="734775353"/>
+      </p:ext>
+    </p:extLst>
+  </p:cSld>
+  <p:clrMapOvr>
+    <a:masterClrMapping/>
+  </p:clrMapOvr>
+</p:sld>
+</file>
+
+<file path=ppt/slides/slide11.xml><?xml version="1.0" encoding="utf-8"?>
+<p:sld xmlns:a="http://schemas.openxmlformats.org/drawingml/2006/main" xmlns:r="http://schemas.openxmlformats.org/officeDocument/2006/relationships" xmlns:p="http://schemas.openxmlformats.org/presentationml/2006/main">
+  <p:cSld>
+    <p:spTree>
+      <p:nvGrpSpPr>
+        <p:cNvPr id="1" name="">
+          <a:extLst>
+            <a:ext uri="{FF2B5EF4-FFF2-40B4-BE49-F238E27FC236}">
+              <a16:creationId xmlns:a16="http://schemas.microsoft.com/office/drawing/2014/main" id="{AEB5D8F5-03EA-0FEE-6C78-8F938E453C9E}"/>
+            </a:ext>
+          </a:extLst>
+        </p:cNvPr>
+        <p:cNvGrpSpPr/>
+        <p:nvPr/>
+      </p:nvGrpSpPr>
+      <p:grpSpPr>
+        <a:xfrm>
+          <a:off x="0" y="0"/>
+          <a:ext cx="0" cy="0"/>
+          <a:chOff x="0" y="0"/>
+          <a:chExt cx="0" cy="0"/>
+        </a:xfrm>
+      </p:grpSpPr>
+    </p:spTree>
+    <p:extLst>
+      <p:ext uri="{BB962C8B-B14F-4D97-AF65-F5344CB8AC3E}">
+        <p14:creationId xmlns:p14="http://schemas.microsoft.com/office/powerpoint/2010/main" val="49405730"/>
+      </p:ext>
+    </p:extLst>
+  </p:cSld>
+  <p:clrMapOvr>
+    <a:masterClrMapping/>
+  </p:clrMapOvr>
+</p:sld>
+</file>
+
+<file path=ppt/slides/slide12.xml><?xml version="1.0" encoding="utf-8"?>
+<p:sld xmlns:a="http://schemas.openxmlformats.org/drawingml/2006/main" xmlns:r="http://schemas.openxmlformats.org/officeDocument/2006/relationships" xmlns:p="http://schemas.openxmlformats.org/presentationml/2006/main">
+  <p:cSld>
+    <p:spTree>
+      <p:nvGrpSpPr>
+        <p:cNvPr id="1" name="">
+          <a:extLst>
+            <a:ext uri="{FF2B5EF4-FFF2-40B4-BE49-F238E27FC236}">
+              <a16:creationId xmlns:a16="http://schemas.microsoft.com/office/drawing/2014/main" id="{B10A1C9D-C168-4E86-1189-765A1239A4C3}"/>
+            </a:ext>
+          </a:extLst>
+        </p:cNvPr>
+        <p:cNvGrpSpPr/>
+        <p:nvPr/>
+      </p:nvGrpSpPr>
+      <p:grpSpPr>
+        <a:xfrm>
+          <a:off x="0" y="0"/>
+          <a:ext cx="0" cy="0"/>
+          <a:chOff x="0" y="0"/>
+          <a:chExt cx="0" cy="0"/>
+        </a:xfrm>
+      </p:grpSpPr>
+    </p:spTree>
+    <p:extLst>
+      <p:ext uri="{BB962C8B-B14F-4D97-AF65-F5344CB8AC3E}">
+        <p14:creationId xmlns:p14="http://schemas.microsoft.com/office/powerpoint/2010/main" val="900903170"/>
+      </p:ext>
+    </p:extLst>
+  </p:cSld>
+  <p:clrMapOvr>
+    <a:masterClrMapping/>
+  </p:clrMapOvr>
+</p:sld>
+</file>
+
+<file path=ppt/slides/slide13.xml><?xml version="1.0" encoding="utf-8"?>
+<p:sld xmlns:a="http://schemas.openxmlformats.org/drawingml/2006/main" xmlns:r="http://schemas.openxmlformats.org/officeDocument/2006/relationships" xmlns:p="http://schemas.openxmlformats.org/presentationml/2006/main">
+  <p:cSld>
+    <p:spTree>
+      <p:nvGrpSpPr>
+        <p:cNvPr id="1" name="">
+          <a:extLst>
+            <a:ext uri="{FF2B5EF4-FFF2-40B4-BE49-F238E27FC236}">
+              <a16:creationId xmlns:a16="http://schemas.microsoft.com/office/drawing/2014/main" id="{52E92400-9E5D-9C59-476B-2C5859FF0207}"/>
+            </a:ext>
+          </a:extLst>
+        </p:cNvPr>
+        <p:cNvGrpSpPr/>
+        <p:nvPr/>
+      </p:nvGrpSpPr>
+      <p:grpSpPr>
+        <a:xfrm>
+          <a:off x="0" y="0"/>
+          <a:ext cx="0" cy="0"/>
+          <a:chOff x="0" y="0"/>
+          <a:chExt cx="0" cy="0"/>
+        </a:xfrm>
+      </p:grpSpPr>
+    </p:spTree>
+    <p:extLst>
+      <p:ext uri="{BB962C8B-B14F-4D97-AF65-F5344CB8AC3E}">
+        <p14:creationId xmlns:p14="http://schemas.microsoft.com/office/powerpoint/2010/main" val="4057885849"/>
+      </p:ext>
+    </p:extLst>
+  </p:cSld>
+  <p:clrMapOvr>
+    <a:masterClrMapping/>
+  </p:clrMapOvr>
+</p:sld>
+</file>
+
 <file path=ppt/slides/slide2.xml><?xml version="1.0" encoding="utf-8"?>
 <p:sld xmlns:a="http://schemas.openxmlformats.org/drawingml/2006/main" xmlns:r="http://schemas.openxmlformats.org/officeDocument/2006/relationships" xmlns:p="http://schemas.openxmlformats.org/presentationml/2006/main">
   <p:cSld>
@@ -8751,7 +8936,7 @@
           <a:p>
             <a:r>
               <a:rPr lang="hu-HU" dirty="0"/>
-              <a:t>sdfasfsd</a:t>
+              <a:t>What is PawnHub?</a:t>
             </a:r>
           </a:p>
         </p:txBody>
@@ -8772,24 +8957,85 @@
             <p:ph sz="half" idx="1"/>
           </p:nvPr>
         </p:nvSpPr>
-        <p:spPr/>
+        <p:spPr>
+          <a:xfrm>
+            <a:off x="838200" y="1825625"/>
+            <a:ext cx="10134600" cy="4351338"/>
+          </a:xfrm>
+        </p:spPr>
         <p:txBody>
-          <a:bodyPr/>
+          <a:bodyPr>
+            <a:normAutofit/>
+          </a:bodyPr>
           <a:lstStyle/>
           <a:p>
             <a:r>
-              <a:rPr lang="hu-HU" dirty="0"/>
-              <a:t>sdfasdfadsf</a:t>
+              <a:rPr lang="hu-HU" sz="3200" dirty="0"/>
+              <a:t>Web app connecting customers with pawnshops</a:t>
+            </a:r>
+          </a:p>
+          <a:p>
+            <a:r>
+              <a:rPr lang="hu-HU" sz="3200" dirty="0"/>
+              <a:t>Simplifies browsing, listing, and managing pawned items</a:t>
+            </a:r>
+          </a:p>
+          <a:p>
+            <a:r>
+              <a:rPr lang="hu-HU" sz="3200" dirty="0"/>
+              <a:t>Modern, user-friendly alternative to traditional pawnshops</a:t>
+            </a:r>
+          </a:p>
+          <a:p>
+            <a:r>
+              <a:rPr lang="hu-HU" sz="3200" dirty="0"/>
+              <a:t>Streamlines communication and transactions</a:t>
             </a:r>
           </a:p>
         </p:txBody>
       </p:sp>
+    </p:spTree>
+    <p:extLst>
+      <p:ext uri="{BB962C8B-B14F-4D97-AF65-F5344CB8AC3E}">
+        <p14:creationId xmlns:p14="http://schemas.microsoft.com/office/powerpoint/2010/main" val="1790967726"/>
+      </p:ext>
+    </p:extLst>
+  </p:cSld>
+  <p:clrMapOvr>
+    <a:masterClrMapping/>
+  </p:clrMapOvr>
+</p:sld>
+</file>
+
+<file path=ppt/slides/slide3.xml><?xml version="1.0" encoding="utf-8"?>
+<p:sld xmlns:a="http://schemas.openxmlformats.org/drawingml/2006/main" xmlns:r="http://schemas.openxmlformats.org/officeDocument/2006/relationships" xmlns:p="http://schemas.openxmlformats.org/presentationml/2006/main">
+  <p:cSld>
+    <p:spTree>
+      <p:nvGrpSpPr>
+        <p:cNvPr id="1" name="">
+          <a:extLst>
+            <a:ext uri="{FF2B5EF4-FFF2-40B4-BE49-F238E27FC236}">
+              <a16:creationId xmlns:a16="http://schemas.microsoft.com/office/drawing/2014/main" id="{D5A2F70D-E0FA-B3B5-B673-3E5C5CFAE694}"/>
+            </a:ext>
+          </a:extLst>
+        </p:cNvPr>
+        <p:cNvGrpSpPr/>
+        <p:nvPr/>
+      </p:nvGrpSpPr>
+      <p:grpSpPr>
+        <a:xfrm>
+          <a:off x="0" y="0"/>
+          <a:ext cx="0" cy="0"/>
+          <a:chOff x="0" y="0"/>
+          <a:chExt cx="0" cy="0"/>
+        </a:xfrm>
+      </p:grpSpPr>
       <p:sp>
         <p:nvSpPr>
-          <p:cNvPr id="4" name="Content Placeholder 3">
-            <a:extLst>
-              <a:ext uri="{FF2B5EF4-FFF2-40B4-BE49-F238E27FC236}">
-                <a16:creationId xmlns:a16="http://schemas.microsoft.com/office/drawing/2014/main" id="{AB0B8F5E-7F22-1899-27C3-DE4B4B319C6F}"/>
+          <p:cNvPr id="2" name="Title 1">
+            <a:extLst>
+              <a:ext uri="{FF2B5EF4-FFF2-40B4-BE49-F238E27FC236}">
+                <a16:creationId xmlns:a16="http://schemas.microsoft.com/office/drawing/2014/main" id="{A3CD11F7-2889-8183-C819-A9EC57922251}"/>
               </a:ext>
             </a:extLst>
           </p:cNvPr>
@@ -8797,7 +9043,7 @@
             <a:spLocks noGrp="1"/>
           </p:cNvSpPr>
           <p:nvPr>
-            <p:ph sz="half" idx="2"/>
+            <p:ph type="ctrTitle"/>
           </p:nvPr>
         </p:nvSpPr>
         <p:spPr/>
@@ -8805,14 +9051,460 @@
           <a:bodyPr/>
           <a:lstStyle/>
           <a:p>
-            <a:endParaRPr lang="hu-HU"/>
+            <a:r>
+              <a:rPr lang="hu-HU" cap="none" spc="0" dirty="0"/>
+              <a:t>Registration</a:t>
+            </a:r>
+          </a:p>
+        </p:txBody>
+      </p:sp>
+      <p:sp>
+        <p:nvSpPr>
+          <p:cNvPr id="3" name="Subtitle 2">
+            <a:extLst>
+              <a:ext uri="{FF2B5EF4-FFF2-40B4-BE49-F238E27FC236}">
+                <a16:creationId xmlns:a16="http://schemas.microsoft.com/office/drawing/2014/main" id="{C2371EC0-8C65-A015-FFBA-59841A77CD29}"/>
+              </a:ext>
+            </a:extLst>
+          </p:cNvPr>
+          <p:cNvSpPr>
+            <a:spLocks noGrp="1"/>
+          </p:cNvSpPr>
+          <p:nvPr>
+            <p:ph type="subTitle" idx="1"/>
+          </p:nvPr>
+        </p:nvSpPr>
+        <p:spPr/>
+        <p:txBody>
+          <a:bodyPr/>
+          <a:lstStyle/>
+          <a:p>
+            <a:r>
+              <a:rPr lang="hu-HU" cap="none" spc="0" dirty="0"/>
+              <a:t>Creating a Customer or a Shop account</a:t>
+            </a:r>
           </a:p>
         </p:txBody>
       </p:sp>
     </p:spTree>
     <p:extLst>
       <p:ext uri="{BB962C8B-B14F-4D97-AF65-F5344CB8AC3E}">
-        <p14:creationId xmlns:p14="http://schemas.microsoft.com/office/powerpoint/2010/main" val="1790967726"/>
+        <p14:creationId xmlns:p14="http://schemas.microsoft.com/office/powerpoint/2010/main" val="1729830960"/>
+      </p:ext>
+    </p:extLst>
+  </p:cSld>
+  <p:clrMapOvr>
+    <a:masterClrMapping/>
+  </p:clrMapOvr>
+</p:sld>
+</file>
+
+<file path=ppt/slides/slide4.xml><?xml version="1.0" encoding="utf-8"?>
+<p:sld xmlns:a="http://schemas.openxmlformats.org/drawingml/2006/main" xmlns:r="http://schemas.openxmlformats.org/officeDocument/2006/relationships" xmlns:p="http://schemas.openxmlformats.org/presentationml/2006/main">
+  <p:cSld>
+    <p:spTree>
+      <p:nvGrpSpPr>
+        <p:cNvPr id="1" name=""/>
+        <p:cNvGrpSpPr/>
+        <p:nvPr/>
+      </p:nvGrpSpPr>
+      <p:grpSpPr>
+        <a:xfrm>
+          <a:off x="0" y="0"/>
+          <a:ext cx="0" cy="0"/>
+          <a:chOff x="0" y="0"/>
+          <a:chExt cx="0" cy="0"/>
+        </a:xfrm>
+      </p:grpSpPr>
+      <p:pic>
+        <p:nvPicPr>
+          <p:cNvPr id="3" name="Picture 2">
+            <a:extLst>
+              <a:ext uri="{FF2B5EF4-FFF2-40B4-BE49-F238E27FC236}">
+                <a16:creationId xmlns:a16="http://schemas.microsoft.com/office/drawing/2014/main" id="{C1A9364F-F49A-61CD-2E6C-047AEB4AC2FE}"/>
+              </a:ext>
+            </a:extLst>
+          </p:cNvPr>
+          <p:cNvPicPr>
+            <a:picLocks noChangeAspect="1"/>
+          </p:cNvPicPr>
+          <p:nvPr/>
+        </p:nvPicPr>
+        <p:blipFill>
+          <a:blip r:embed="rId2"/>
+          <a:stretch>
+            <a:fillRect/>
+          </a:stretch>
+        </p:blipFill>
+        <p:spPr>
+          <a:xfrm>
+            <a:off x="348342" y="0"/>
+            <a:ext cx="11495315" cy="6858000"/>
+          </a:xfrm>
+          <a:prstGeom prst="rect">
+            <a:avLst/>
+          </a:prstGeom>
+        </p:spPr>
+      </p:pic>
+    </p:spTree>
+    <p:extLst>
+      <p:ext uri="{BB962C8B-B14F-4D97-AF65-F5344CB8AC3E}">
+        <p14:creationId xmlns:p14="http://schemas.microsoft.com/office/powerpoint/2010/main" val="3518312934"/>
+      </p:ext>
+    </p:extLst>
+  </p:cSld>
+  <p:clrMapOvr>
+    <a:masterClrMapping/>
+  </p:clrMapOvr>
+</p:sld>
+</file>
+
+<file path=ppt/slides/slide5.xml><?xml version="1.0" encoding="utf-8"?>
+<p:sld xmlns:a="http://schemas.openxmlformats.org/drawingml/2006/main" xmlns:r="http://schemas.openxmlformats.org/officeDocument/2006/relationships" xmlns:p="http://schemas.openxmlformats.org/presentationml/2006/main">
+  <p:cSld>
+    <p:spTree>
+      <p:nvGrpSpPr>
+        <p:cNvPr id="1" name="">
+          <a:extLst>
+            <a:ext uri="{FF2B5EF4-FFF2-40B4-BE49-F238E27FC236}">
+              <a16:creationId xmlns:a16="http://schemas.microsoft.com/office/drawing/2014/main" id="{D2255E26-AA98-7104-E836-0156379FF6EA}"/>
+            </a:ext>
+          </a:extLst>
+        </p:cNvPr>
+        <p:cNvGrpSpPr/>
+        <p:nvPr/>
+      </p:nvGrpSpPr>
+      <p:grpSpPr>
+        <a:xfrm>
+          <a:off x="0" y="0"/>
+          <a:ext cx="0" cy="0"/>
+          <a:chOff x="0" y="0"/>
+          <a:chExt cx="0" cy="0"/>
+        </a:xfrm>
+      </p:grpSpPr>
+      <p:pic>
+        <p:nvPicPr>
+          <p:cNvPr id="4" name="Picture 3">
+            <a:extLst>
+              <a:ext uri="{FF2B5EF4-FFF2-40B4-BE49-F238E27FC236}">
+                <a16:creationId xmlns:a16="http://schemas.microsoft.com/office/drawing/2014/main" id="{A8D9DD4C-485A-DEAD-02E4-0F7378FC2068}"/>
+              </a:ext>
+            </a:extLst>
+          </p:cNvPr>
+          <p:cNvPicPr>
+            <a:picLocks noChangeAspect="1"/>
+          </p:cNvPicPr>
+          <p:nvPr/>
+        </p:nvPicPr>
+        <p:blipFill>
+          <a:blip r:embed="rId2"/>
+          <a:stretch>
+            <a:fillRect/>
+          </a:stretch>
+        </p:blipFill>
+        <p:spPr>
+          <a:xfrm>
+            <a:off x="145897" y="0"/>
+            <a:ext cx="11900205" cy="6858000"/>
+          </a:xfrm>
+          <a:prstGeom prst="rect">
+            <a:avLst/>
+          </a:prstGeom>
+        </p:spPr>
+      </p:pic>
+    </p:spTree>
+    <p:extLst>
+      <p:ext uri="{BB962C8B-B14F-4D97-AF65-F5344CB8AC3E}">
+        <p14:creationId xmlns:p14="http://schemas.microsoft.com/office/powerpoint/2010/main" val="988440025"/>
+      </p:ext>
+    </p:extLst>
+  </p:cSld>
+  <p:clrMapOvr>
+    <a:masterClrMapping/>
+  </p:clrMapOvr>
+</p:sld>
+</file>
+
+<file path=ppt/slides/slide6.xml><?xml version="1.0" encoding="utf-8"?>
+<p:sld xmlns:a="http://schemas.openxmlformats.org/drawingml/2006/main" xmlns:r="http://schemas.openxmlformats.org/officeDocument/2006/relationships" xmlns:p="http://schemas.openxmlformats.org/presentationml/2006/main">
+  <p:cSld>
+    <p:spTree>
+      <p:nvGrpSpPr>
+        <p:cNvPr id="1" name=""/>
+        <p:cNvGrpSpPr/>
+        <p:nvPr/>
+      </p:nvGrpSpPr>
+      <p:grpSpPr>
+        <a:xfrm>
+          <a:off x="0" y="0"/>
+          <a:ext cx="0" cy="0"/>
+          <a:chOff x="0" y="0"/>
+          <a:chExt cx="0" cy="0"/>
+        </a:xfrm>
+      </p:grpSpPr>
+      <p:pic>
+        <p:nvPicPr>
+          <p:cNvPr id="7" name="Picture 6">
+            <a:extLst>
+              <a:ext uri="{FF2B5EF4-FFF2-40B4-BE49-F238E27FC236}">
+                <a16:creationId xmlns:a16="http://schemas.microsoft.com/office/drawing/2014/main" id="{F24AE060-5979-01C2-E94D-9735FD3C37C5}"/>
+              </a:ext>
+            </a:extLst>
+          </p:cNvPr>
+          <p:cNvPicPr>
+            <a:picLocks noChangeAspect="1"/>
+          </p:cNvPicPr>
+          <p:nvPr/>
+        </p:nvPicPr>
+        <p:blipFill>
+          <a:blip r:embed="rId2"/>
+          <a:stretch>
+            <a:fillRect/>
+          </a:stretch>
+        </p:blipFill>
+        <p:spPr>
+          <a:xfrm>
+            <a:off x="965415" y="0"/>
+            <a:ext cx="10261169" cy="6858000"/>
+          </a:xfrm>
+          <a:prstGeom prst="rect">
+            <a:avLst/>
+          </a:prstGeom>
+        </p:spPr>
+      </p:pic>
+    </p:spTree>
+    <p:extLst>
+      <p:ext uri="{BB962C8B-B14F-4D97-AF65-F5344CB8AC3E}">
+        <p14:creationId xmlns:p14="http://schemas.microsoft.com/office/powerpoint/2010/main" val="776217197"/>
+      </p:ext>
+    </p:extLst>
+  </p:cSld>
+  <p:clrMapOvr>
+    <a:masterClrMapping/>
+  </p:clrMapOvr>
+</p:sld>
+</file>
+
+<file path=ppt/slides/slide7.xml><?xml version="1.0" encoding="utf-8"?>
+<p:sld xmlns:a="http://schemas.openxmlformats.org/drawingml/2006/main" xmlns:r="http://schemas.openxmlformats.org/officeDocument/2006/relationships" xmlns:p="http://schemas.openxmlformats.org/presentationml/2006/main">
+  <p:cSld>
+    <p:spTree>
+      <p:nvGrpSpPr>
+        <p:cNvPr id="1" name="">
+          <a:extLst>
+            <a:ext uri="{FF2B5EF4-FFF2-40B4-BE49-F238E27FC236}">
+              <a16:creationId xmlns:a16="http://schemas.microsoft.com/office/drawing/2014/main" id="{D59F72F8-657C-B7E3-D346-E64AB0D290DA}"/>
+            </a:ext>
+          </a:extLst>
+        </p:cNvPr>
+        <p:cNvGrpSpPr/>
+        <p:nvPr/>
+      </p:nvGrpSpPr>
+      <p:grpSpPr>
+        <a:xfrm>
+          <a:off x="0" y="0"/>
+          <a:ext cx="0" cy="0"/>
+          <a:chOff x="0" y="0"/>
+          <a:chExt cx="0" cy="0"/>
+        </a:xfrm>
+      </p:grpSpPr>
+      <p:pic>
+        <p:nvPicPr>
+          <p:cNvPr id="3" name="Picture 2">
+            <a:extLst>
+              <a:ext uri="{FF2B5EF4-FFF2-40B4-BE49-F238E27FC236}">
+                <a16:creationId xmlns:a16="http://schemas.microsoft.com/office/drawing/2014/main" id="{CFACCFEF-0704-D198-69A2-D95FAD4D96B8}"/>
+              </a:ext>
+            </a:extLst>
+          </p:cNvPr>
+          <p:cNvPicPr>
+            <a:picLocks noChangeAspect="1"/>
+          </p:cNvPicPr>
+          <p:nvPr/>
+        </p:nvPicPr>
+        <p:blipFill>
+          <a:blip r:embed="rId2"/>
+          <a:stretch>
+            <a:fillRect/>
+          </a:stretch>
+        </p:blipFill>
+        <p:spPr>
+          <a:xfrm>
+            <a:off x="1763911" y="0"/>
+            <a:ext cx="8664177" cy="6858000"/>
+          </a:xfrm>
+          <a:prstGeom prst="rect">
+            <a:avLst/>
+          </a:prstGeom>
+        </p:spPr>
+      </p:pic>
+    </p:spTree>
+    <p:extLst>
+      <p:ext uri="{BB962C8B-B14F-4D97-AF65-F5344CB8AC3E}">
+        <p14:creationId xmlns:p14="http://schemas.microsoft.com/office/powerpoint/2010/main" val="592790389"/>
+      </p:ext>
+    </p:extLst>
+  </p:cSld>
+  <p:clrMapOvr>
+    <a:masterClrMapping/>
+  </p:clrMapOvr>
+</p:sld>
+</file>
+
+<file path=ppt/slides/slide8.xml><?xml version="1.0" encoding="utf-8"?>
+<p:sld xmlns:a="http://schemas.openxmlformats.org/drawingml/2006/main" xmlns:r="http://schemas.openxmlformats.org/officeDocument/2006/relationships" xmlns:p="http://schemas.openxmlformats.org/presentationml/2006/main">
+  <p:cSld>
+    <p:spTree>
+      <p:nvGrpSpPr>
+        <p:cNvPr id="1" name="">
+          <a:extLst>
+            <a:ext uri="{FF2B5EF4-FFF2-40B4-BE49-F238E27FC236}">
+              <a16:creationId xmlns:a16="http://schemas.microsoft.com/office/drawing/2014/main" id="{F53034A8-375B-F513-9D83-63A1E7B8582B}"/>
+            </a:ext>
+          </a:extLst>
+        </p:cNvPr>
+        <p:cNvGrpSpPr/>
+        <p:nvPr/>
+      </p:nvGrpSpPr>
+      <p:grpSpPr>
+        <a:xfrm>
+          <a:off x="0" y="0"/>
+          <a:ext cx="0" cy="0"/>
+          <a:chOff x="0" y="0"/>
+          <a:chExt cx="0" cy="0"/>
+        </a:xfrm>
+      </p:grpSpPr>
+      <p:pic>
+        <p:nvPicPr>
+          <p:cNvPr id="3" name="Picture 2">
+            <a:extLst>
+              <a:ext uri="{FF2B5EF4-FFF2-40B4-BE49-F238E27FC236}">
+                <a16:creationId xmlns:a16="http://schemas.microsoft.com/office/drawing/2014/main" id="{2E139531-06DF-BB6E-0C33-D6B784A22DDE}"/>
+              </a:ext>
+            </a:extLst>
+          </p:cNvPr>
+          <p:cNvPicPr>
+            <a:picLocks noChangeAspect="1"/>
+          </p:cNvPicPr>
+          <p:nvPr/>
+        </p:nvPicPr>
+        <p:blipFill>
+          <a:blip r:embed="rId2"/>
+          <a:stretch>
+            <a:fillRect/>
+          </a:stretch>
+        </p:blipFill>
+        <p:spPr>
+          <a:xfrm>
+            <a:off x="3843023" y="1976235"/>
+            <a:ext cx="4505954" cy="2905530"/>
+          </a:xfrm>
+          <a:prstGeom prst="rect">
+            <a:avLst/>
+          </a:prstGeom>
+        </p:spPr>
+      </p:pic>
+    </p:spTree>
+    <p:extLst>
+      <p:ext uri="{BB962C8B-B14F-4D97-AF65-F5344CB8AC3E}">
+        <p14:creationId xmlns:p14="http://schemas.microsoft.com/office/powerpoint/2010/main" val="819315807"/>
+      </p:ext>
+    </p:extLst>
+  </p:cSld>
+  <p:clrMapOvr>
+    <a:masterClrMapping/>
+  </p:clrMapOvr>
+</p:sld>
+</file>
+
+<file path=ppt/slides/slide9.xml><?xml version="1.0" encoding="utf-8"?>
+<p:sld xmlns:a="http://schemas.openxmlformats.org/drawingml/2006/main" xmlns:r="http://schemas.openxmlformats.org/officeDocument/2006/relationships" xmlns:p="http://schemas.openxmlformats.org/presentationml/2006/main">
+  <p:cSld>
+    <p:spTree>
+      <p:nvGrpSpPr>
+        <p:cNvPr id="1" name="">
+          <a:extLst>
+            <a:ext uri="{FF2B5EF4-FFF2-40B4-BE49-F238E27FC236}">
+              <a16:creationId xmlns:a16="http://schemas.microsoft.com/office/drawing/2014/main" id="{3BF25999-31AF-D658-FEF3-D9BA52D9C364}"/>
+            </a:ext>
+          </a:extLst>
+        </p:cNvPr>
+        <p:cNvGrpSpPr/>
+        <p:nvPr/>
+      </p:nvGrpSpPr>
+      <p:grpSpPr>
+        <a:xfrm>
+          <a:off x="0" y="0"/>
+          <a:ext cx="0" cy="0"/>
+          <a:chOff x="0" y="0"/>
+          <a:chExt cx="0" cy="0"/>
+        </a:xfrm>
+      </p:grpSpPr>
+      <p:sp>
+        <p:nvSpPr>
+          <p:cNvPr id="2" name="Title 1">
+            <a:extLst>
+              <a:ext uri="{FF2B5EF4-FFF2-40B4-BE49-F238E27FC236}">
+                <a16:creationId xmlns:a16="http://schemas.microsoft.com/office/drawing/2014/main" id="{628F8923-43BF-EC3D-1CEC-33E0E88E5D21}"/>
+              </a:ext>
+            </a:extLst>
+          </p:cNvPr>
+          <p:cNvSpPr>
+            <a:spLocks noGrp="1"/>
+          </p:cNvSpPr>
+          <p:nvPr>
+            <p:ph type="ctrTitle"/>
+          </p:nvPr>
+        </p:nvSpPr>
+        <p:spPr/>
+        <p:txBody>
+          <a:bodyPr/>
+          <a:lstStyle/>
+          <a:p>
+            <a:r>
+              <a:rPr lang="hu-HU" cap="none" spc="0" dirty="0"/>
+              <a:t>Log in</a:t>
+            </a:r>
+          </a:p>
+        </p:txBody>
+      </p:sp>
+      <p:sp>
+        <p:nvSpPr>
+          <p:cNvPr id="3" name="Subtitle 2">
+            <a:extLst>
+              <a:ext uri="{FF2B5EF4-FFF2-40B4-BE49-F238E27FC236}">
+                <a16:creationId xmlns:a16="http://schemas.microsoft.com/office/drawing/2014/main" id="{CB6D7820-CD46-987D-9136-4CEA446840BE}"/>
+              </a:ext>
+            </a:extLst>
+          </p:cNvPr>
+          <p:cNvSpPr>
+            <a:spLocks noGrp="1"/>
+          </p:cNvSpPr>
+          <p:nvPr>
+            <p:ph type="subTitle" idx="1"/>
+          </p:nvPr>
+        </p:nvSpPr>
+        <p:spPr/>
+        <p:txBody>
+          <a:bodyPr/>
+          <a:lstStyle/>
+          <a:p>
+            <a:r>
+              <a:rPr lang="hu-HU" cap="none" spc="0" dirty="0"/>
+              <a:t>Logging </a:t>
+            </a:r>
+            <a:r>
+              <a:rPr lang="hu-HU" cap="none" spc="0"/>
+              <a:t>in to your PawnHub account</a:t>
+            </a:r>
+            <a:endParaRPr lang="hu-HU" cap="none" spc="0" dirty="0"/>
+          </a:p>
+        </p:txBody>
+      </p:sp>
+    </p:spTree>
+    <p:extLst>
+      <p:ext uri="{BB962C8B-B14F-4D97-AF65-F5344CB8AC3E}">
+        <p14:creationId xmlns:p14="http://schemas.microsoft.com/office/powerpoint/2010/main" val="3036022261"/>
       </p:ext>
     </p:extLst>
   </p:cSld>

</xml_diff>